<commit_message>
Fixata gestione turno dopo rimozione player
</commit_message>
<xml_diff>
--- a/Presentazione progetto PAJC - 736418.pptx
+++ b/Presentazione progetto PAJC - 736418.pptx
@@ -278,7 +278,7 @@
           <a:p>
             <a:fld id="{E8DE9CC9-8C8D-48CC-84A7-97078963374C}" type="datetimeFigureOut">
               <a:rPr lang="en-GB" smtClean="0"/>
-              <a:t>19/03/2023</a:t>
+              <a:t>20/03/2023</a:t>
             </a:fld>
             <a:endParaRPr lang="en-GB"/>
           </a:p>
@@ -478,7 +478,7 @@
           <a:p>
             <a:fld id="{E8DE9CC9-8C8D-48CC-84A7-97078963374C}" type="datetimeFigureOut">
               <a:rPr lang="en-GB" smtClean="0"/>
-              <a:t>19/03/2023</a:t>
+              <a:t>20/03/2023</a:t>
             </a:fld>
             <a:endParaRPr lang="en-GB"/>
           </a:p>
@@ -688,7 +688,7 @@
           <a:p>
             <a:fld id="{E8DE9CC9-8C8D-48CC-84A7-97078963374C}" type="datetimeFigureOut">
               <a:rPr lang="en-GB" smtClean="0"/>
-              <a:t>19/03/2023</a:t>
+              <a:t>20/03/2023</a:t>
             </a:fld>
             <a:endParaRPr lang="en-GB"/>
           </a:p>
@@ -888,7 +888,7 @@
           <a:p>
             <a:fld id="{E8DE9CC9-8C8D-48CC-84A7-97078963374C}" type="datetimeFigureOut">
               <a:rPr lang="en-GB" smtClean="0"/>
-              <a:t>19/03/2023</a:t>
+              <a:t>20/03/2023</a:t>
             </a:fld>
             <a:endParaRPr lang="en-GB"/>
           </a:p>
@@ -1164,7 +1164,7 @@
           <a:p>
             <a:fld id="{E8DE9CC9-8C8D-48CC-84A7-97078963374C}" type="datetimeFigureOut">
               <a:rPr lang="en-GB" smtClean="0"/>
-              <a:t>19/03/2023</a:t>
+              <a:t>20/03/2023</a:t>
             </a:fld>
             <a:endParaRPr lang="en-GB"/>
           </a:p>
@@ -1432,7 +1432,7 @@
           <a:p>
             <a:fld id="{E8DE9CC9-8C8D-48CC-84A7-97078963374C}" type="datetimeFigureOut">
               <a:rPr lang="en-GB" smtClean="0"/>
-              <a:t>19/03/2023</a:t>
+              <a:t>20/03/2023</a:t>
             </a:fld>
             <a:endParaRPr lang="en-GB"/>
           </a:p>
@@ -1847,7 +1847,7 @@
           <a:p>
             <a:fld id="{E8DE9CC9-8C8D-48CC-84A7-97078963374C}" type="datetimeFigureOut">
               <a:rPr lang="en-GB" smtClean="0"/>
-              <a:t>19/03/2023</a:t>
+              <a:t>20/03/2023</a:t>
             </a:fld>
             <a:endParaRPr lang="en-GB"/>
           </a:p>
@@ -1989,7 +1989,7 @@
           <a:p>
             <a:fld id="{E8DE9CC9-8C8D-48CC-84A7-97078963374C}" type="datetimeFigureOut">
               <a:rPr lang="en-GB" smtClean="0"/>
-              <a:t>19/03/2023</a:t>
+              <a:t>20/03/2023</a:t>
             </a:fld>
             <a:endParaRPr lang="en-GB"/>
           </a:p>
@@ -2102,7 +2102,7 @@
           <a:p>
             <a:fld id="{E8DE9CC9-8C8D-48CC-84A7-97078963374C}" type="datetimeFigureOut">
               <a:rPr lang="en-GB" smtClean="0"/>
-              <a:t>19/03/2023</a:t>
+              <a:t>20/03/2023</a:t>
             </a:fld>
             <a:endParaRPr lang="en-GB"/>
           </a:p>
@@ -2415,7 +2415,7 @@
           <a:p>
             <a:fld id="{E8DE9CC9-8C8D-48CC-84A7-97078963374C}" type="datetimeFigureOut">
               <a:rPr lang="en-GB" smtClean="0"/>
-              <a:t>19/03/2023</a:t>
+              <a:t>20/03/2023</a:t>
             </a:fld>
             <a:endParaRPr lang="en-GB"/>
           </a:p>
@@ -2704,7 +2704,7 @@
           <a:p>
             <a:fld id="{E8DE9CC9-8C8D-48CC-84A7-97078963374C}" type="datetimeFigureOut">
               <a:rPr lang="en-GB" smtClean="0"/>
-              <a:t>19/03/2023</a:t>
+              <a:t>20/03/2023</a:t>
             </a:fld>
             <a:endParaRPr lang="en-GB"/>
           </a:p>
@@ -2947,7 +2947,7 @@
           <a:p>
             <a:fld id="{E8DE9CC9-8C8D-48CC-84A7-97078963374C}" type="datetimeFigureOut">
               <a:rPr lang="en-GB" smtClean="0"/>
-              <a:t>19/03/2023</a:t>
+              <a:t>20/03/2023</a:t>
             </a:fld>
             <a:endParaRPr lang="en-GB"/>
           </a:p>
@@ -5918,13 +5918,13 @@
   <p:clrMapOvr>
     <a:masterClrMapping/>
   </p:clrMapOvr>
-  <mc:AlternateContent xmlns:mc="http://schemas.openxmlformats.org/markup-compatibility/2006">
-    <mc:Choice xmlns:p159="http://schemas.microsoft.com/office/powerpoint/2015/09/main" Requires="p159">
+  <mc:AlternateContent xmlns:mc="http://schemas.openxmlformats.org/markup-compatibility/2006" xmlns:p159="http://schemas.microsoft.com/office/powerpoint/2015/09/main">
+    <mc:Choice Requires="p159">
       <p:transition xmlns:p14="http://schemas.microsoft.com/office/powerpoint/2010/main" spd="slow" p14:dur="2000" advClick="0">
         <p159:morph option="byObject"/>
       </p:transition>
     </mc:Choice>
-    <mc:Fallback>
+    <mc:Fallback xmlns="">
       <p:transition spd="slow" advClick="0">
         <p:fade/>
       </p:transition>
@@ -6140,7 +6140,7 @@
               <a:rPr lang="en-GB" sz="3200" dirty="0">
                 <a:latin typeface="Kabel Bk BT" panose="020D0402020204020904" pitchFamily="34" charset="0"/>
               </a:rPr>
-              <a:t> (ad esempio </a:t>
+              <a:t> (es. </a:t>
             </a:r>
             <a:r>
               <a:rPr lang="en-GB" sz="3200" dirty="0" err="1">
@@ -6238,7 +6238,19 @@
               <a:rPr lang="en-GB" sz="3200" dirty="0">
                 <a:latin typeface="Kabel Bk BT" panose="020D0402020204020904" pitchFamily="34" charset="0"/>
               </a:rPr>
-              <a:t> (file SVG al posto di PNG per </a:t>
+              <a:t> </a:t>
+            </a:r>
+            <a:r>
+              <a:rPr lang="en-GB" sz="3200">
+                <a:latin typeface="Kabel Bk BT" panose="020D0402020204020904" pitchFamily="34" charset="0"/>
+              </a:rPr>
+              <a:t>(es. file </a:t>
+            </a:r>
+            <a:r>
+              <a:rPr lang="en-GB" sz="3200" dirty="0">
+                <a:latin typeface="Kabel Bk BT" panose="020D0402020204020904" pitchFamily="34" charset="0"/>
+              </a:rPr>
+              <a:t>SVG al posto di PNG per </a:t>
             </a:r>
             <a:r>
               <a:rPr lang="en-GB" sz="3200" dirty="0" err="1">

</xml_diff>